<commit_message>
added launcher icon for app
</commit_message>
<xml_diff>
--- a/Kiddo.pptx
+++ b/Kiddo.pptx
@@ -5,20 +5,18 @@
     <p:sldMasterId id="2147483648" r:id="rId2"/>
   </p:sldMasterIdLst>
   <p:notesMasterIdLst>
-    <p:notesMasterId r:id="rId11"/>
+    <p:notesMasterId r:id="rId9"/>
   </p:notesMasterIdLst>
   <p:handoutMasterIdLst>
-    <p:handoutMasterId r:id="rId12"/>
+    <p:handoutMasterId r:id="rId10"/>
   </p:handoutMasterIdLst>
   <p:sldIdLst>
     <p:sldId id="257" r:id="rId3"/>
     <p:sldId id="269" r:id="rId4"/>
-    <p:sldId id="272" r:id="rId5"/>
-    <p:sldId id="265" r:id="rId6"/>
-    <p:sldId id="275" r:id="rId7"/>
-    <p:sldId id="277" r:id="rId8"/>
-    <p:sldId id="278" r:id="rId9"/>
-    <p:sldId id="279" r:id="rId10"/>
+    <p:sldId id="265" r:id="rId5"/>
+    <p:sldId id="275" r:id="rId6"/>
+    <p:sldId id="277" r:id="rId7"/>
+    <p:sldId id="272" r:id="rId8"/>
   </p:sldIdLst>
   <p:sldSz cx="12192000" cy="6858000"/>
   <p:notesSz cx="6858000" cy="9144000"/>
@@ -210,7 +208,7 @@
           <a:p>
             <a:fld id="{FFBE2AAA-2CC7-4F9C-A8C6-8B9F2A3E9EF0}" type="datetimeFigureOut">
               <a:rPr lang="en-US" smtClean="0"/>
-              <a:t>11/21/2016</a:t>
+              <a:t>12/5/2016</a:t>
             </a:fld>
             <a:endParaRPr lang="en-US"/>
           </a:p>
@@ -375,7 +373,7 @@
           <a:p>
             <a:fld id="{2B37ADBA-1AC7-4CD6-8AFF-4E8087BA5487}" type="datetimeFigureOut">
               <a:rPr lang="en-US" smtClean="0"/>
-              <a:t>11/21/2016</a:t>
+              <a:t>12/5/2016</a:t>
             </a:fld>
             <a:endParaRPr lang="en-US"/>
           </a:p>
@@ -439,38 +437,37 @@
           <a:p>
             <a:pPr lvl="0"/>
             <a:r>
-              <a:rPr lang="en-US" smtClean="0"/>
+              <a:rPr lang="en-US"/>
               <a:t>Click to edit Master text styles</a:t>
             </a:r>
           </a:p>
           <a:p>
             <a:pPr lvl="1"/>
             <a:r>
-              <a:rPr lang="en-US" smtClean="0"/>
+              <a:rPr lang="en-US"/>
               <a:t>Second level</a:t>
             </a:r>
           </a:p>
           <a:p>
             <a:pPr lvl="2"/>
             <a:r>
-              <a:rPr lang="en-US" smtClean="0"/>
+              <a:rPr lang="en-US"/>
               <a:t>Third level</a:t>
             </a:r>
           </a:p>
           <a:p>
             <a:pPr lvl="3"/>
             <a:r>
-              <a:rPr lang="en-US" smtClean="0"/>
+              <a:rPr lang="en-US"/>
               <a:t>Fourth level</a:t>
             </a:r>
           </a:p>
           <a:p>
             <a:pPr lvl="4"/>
             <a:r>
-              <a:rPr lang="en-US" smtClean="0"/>
+              <a:rPr lang="en-US"/>
               <a:t>Fifth level</a:t>
             </a:r>
-            <a:endParaRPr lang="en-US"/>
           </a:p>
         </p:txBody>
       </p:sp>
@@ -716,7 +713,7 @@
           </a:lstStyle>
           <a:p>
             <a:r>
-              <a:rPr lang="en-US" smtClean="0"/>
+              <a:rPr lang="en-US"/>
               <a:t>Click to edit Master title style</a:t>
             </a:r>
             <a:endParaRPr lang="en-US" dirty="0"/>
@@ -788,7 +785,7 @@
           </a:lstStyle>
           <a:p>
             <a:r>
-              <a:rPr lang="en-US" smtClean="0"/>
+              <a:rPr lang="en-US"/>
               <a:t>Click to edit Master subtitle style</a:t>
             </a:r>
             <a:endParaRPr lang="en-US" dirty="0"/>
@@ -1071,10 +1068,9 @@
           </a:lstStyle>
           <a:p>
             <a:r>
-              <a:rPr lang="en-US" smtClean="0"/>
+              <a:rPr lang="en-US"/>
               <a:t>Click icon to add picture</a:t>
             </a:r>
-            <a:endParaRPr lang="en-US"/>
           </a:p>
         </p:txBody>
       </p:sp>
@@ -1282,10 +1278,9 @@
           </a:lstStyle>
           <a:p>
             <a:r>
-              <a:rPr lang="en-US" smtClean="0"/>
+              <a:rPr lang="en-US"/>
               <a:t>Click icon to add picture</a:t>
             </a:r>
-            <a:endParaRPr lang="en-US"/>
           </a:p>
         </p:txBody>
       </p:sp>
@@ -1346,7 +1341,7 @@
           <a:p>
             <a:pPr lvl="0"/>
             <a:r>
-              <a:rPr lang="en-US" smtClean="0"/>
+              <a:rPr lang="en-US"/>
               <a:t>Click to edit Master text styles</a:t>
             </a:r>
           </a:p>
@@ -1409,7 +1404,7 @@
           <a:p>
             <a:pPr lvl="0"/>
             <a:r>
-              <a:rPr lang="en-US" smtClean="0"/>
+              <a:rPr lang="en-US"/>
               <a:t>Click to edit Master text styles</a:t>
             </a:r>
           </a:p>
@@ -1691,10 +1686,9 @@
           </a:lstStyle>
           <a:p>
             <a:r>
-              <a:rPr lang="en-US" smtClean="0"/>
+              <a:rPr lang="en-US"/>
               <a:t>Click icon to add picture</a:t>
             </a:r>
-            <a:endParaRPr lang="en-US"/>
           </a:p>
         </p:txBody>
       </p:sp>
@@ -1902,10 +1896,9 @@
           </a:lstStyle>
           <a:p>
             <a:r>
-              <a:rPr lang="en-US" smtClean="0"/>
+              <a:rPr lang="en-US"/>
               <a:t>Click icon to add picture</a:t>
             </a:r>
-            <a:endParaRPr lang="en-US"/>
           </a:p>
         </p:txBody>
       </p:sp>
@@ -1969,7 +1962,7 @@
           <a:p>
             <a:pPr lvl="0"/>
             <a:r>
-              <a:rPr lang="en-US" smtClean="0"/>
+              <a:rPr lang="en-US"/>
               <a:t>Click to edit Master text styles</a:t>
             </a:r>
           </a:p>
@@ -2179,10 +2172,9 @@
           </a:lstStyle>
           <a:p>
             <a:r>
-              <a:rPr lang="en-US" smtClean="0"/>
+              <a:rPr lang="en-US"/>
               <a:t>Click icon to add picture</a:t>
             </a:r>
-            <a:endParaRPr lang="en-US"/>
           </a:p>
         </p:txBody>
       </p:sp>
@@ -2217,7 +2209,7 @@
           </a:lstStyle>
           <a:p>
             <a:r>
-              <a:rPr lang="en-US" smtClean="0"/>
+              <a:rPr lang="en-US"/>
               <a:t>Click to edit Master title style</a:t>
             </a:r>
             <a:endParaRPr lang="en-US" dirty="0"/>
@@ -2500,10 +2492,9 @@
           </a:lstStyle>
           <a:p>
             <a:r>
-              <a:rPr lang="en-US" smtClean="0"/>
+              <a:rPr lang="en-US"/>
               <a:t>Click icon to add picture</a:t>
             </a:r>
-            <a:endParaRPr lang="en-US"/>
           </a:p>
         </p:txBody>
       </p:sp>
@@ -2711,10 +2702,9 @@
           </a:lstStyle>
           <a:p>
             <a:r>
-              <a:rPr lang="en-US" smtClean="0"/>
+              <a:rPr lang="en-US"/>
               <a:t>Click icon to add picture</a:t>
             </a:r>
-            <a:endParaRPr lang="en-US"/>
           </a:p>
         </p:txBody>
       </p:sp>
@@ -2922,10 +2912,9 @@
           </a:lstStyle>
           <a:p>
             <a:r>
-              <a:rPr lang="en-US" smtClean="0"/>
+              <a:rPr lang="en-US"/>
               <a:t>Click icon to add picture</a:t>
             </a:r>
-            <a:endParaRPr lang="en-US"/>
           </a:p>
         </p:txBody>
       </p:sp>
@@ -3133,10 +3122,9 @@
           </a:lstStyle>
           <a:p>
             <a:r>
-              <a:rPr lang="en-US" smtClean="0"/>
+              <a:rPr lang="en-US"/>
               <a:t>Click icon to add picture</a:t>
             </a:r>
-            <a:endParaRPr lang="en-US"/>
           </a:p>
         </p:txBody>
       </p:sp>
@@ -3344,10 +3332,9 @@
           </a:lstStyle>
           <a:p>
             <a:r>
-              <a:rPr lang="en-US" smtClean="0"/>
+              <a:rPr lang="en-US"/>
               <a:t>Click icon to add picture</a:t>
             </a:r>
-            <a:endParaRPr lang="en-US"/>
           </a:p>
         </p:txBody>
       </p:sp>
@@ -3409,10 +3396,9 @@
           <a:lstStyle/>
           <a:p>
             <a:r>
-              <a:rPr lang="en-US" smtClean="0"/>
+              <a:rPr lang="en-US"/>
               <a:t>Click to edit Master title style</a:t>
             </a:r>
-            <a:endParaRPr lang="en-US"/>
           </a:p>
         </p:txBody>
       </p:sp>
@@ -3433,38 +3419,37 @@
           <a:p>
             <a:pPr lvl="0"/>
             <a:r>
-              <a:rPr lang="en-US" smtClean="0"/>
+              <a:rPr lang="en-US"/>
               <a:t>Click to edit Master text styles</a:t>
             </a:r>
           </a:p>
           <a:p>
             <a:pPr lvl="1"/>
             <a:r>
-              <a:rPr lang="en-US" smtClean="0"/>
+              <a:rPr lang="en-US"/>
               <a:t>Second level</a:t>
             </a:r>
           </a:p>
           <a:p>
             <a:pPr lvl="2"/>
             <a:r>
-              <a:rPr lang="en-US" smtClean="0"/>
+              <a:rPr lang="en-US"/>
               <a:t>Third level</a:t>
             </a:r>
           </a:p>
           <a:p>
             <a:pPr lvl="3"/>
             <a:r>
-              <a:rPr lang="en-US" smtClean="0"/>
+              <a:rPr lang="en-US"/>
               <a:t>Fourth level</a:t>
             </a:r>
           </a:p>
           <a:p>
             <a:pPr lvl="4"/>
             <a:r>
-              <a:rPr lang="en-US" smtClean="0"/>
+              <a:rPr lang="en-US"/>
               <a:t>Fifth level</a:t>
             </a:r>
-            <a:endParaRPr lang="en-US"/>
           </a:p>
         </p:txBody>
       </p:sp>
@@ -3485,7 +3470,7 @@
           <a:p>
             <a:fld id="{7FC8593D-7C47-471E-A8DF-97AC4FFD13F5}" type="datetimeFigureOut">
               <a:rPr lang="en-US" smtClean="0"/>
-              <a:t>11/21/2016</a:t>
+              <a:t>12/5/2016</a:t>
             </a:fld>
             <a:endParaRPr lang="en-US"/>
           </a:p>
@@ -3596,7 +3581,7 @@
           <a:lstStyle/>
           <a:p>
             <a:r>
-              <a:rPr lang="en-US" smtClean="0"/>
+              <a:rPr lang="en-US"/>
               <a:t>Click to edit Master title style</a:t>
             </a:r>
             <a:endParaRPr lang="en-US" dirty="0"/>
@@ -3625,38 +3610,37 @@
           <a:p>
             <a:pPr lvl="0"/>
             <a:r>
-              <a:rPr lang="en-US" smtClean="0"/>
+              <a:rPr lang="en-US"/>
               <a:t>Click to edit Master text styles</a:t>
             </a:r>
           </a:p>
           <a:p>
             <a:pPr lvl="1"/>
             <a:r>
-              <a:rPr lang="en-US" smtClean="0"/>
+              <a:rPr lang="en-US"/>
               <a:t>Second level</a:t>
             </a:r>
           </a:p>
           <a:p>
             <a:pPr lvl="2"/>
             <a:r>
-              <a:rPr lang="en-US" smtClean="0"/>
+              <a:rPr lang="en-US"/>
               <a:t>Third level</a:t>
             </a:r>
           </a:p>
           <a:p>
             <a:pPr lvl="3"/>
             <a:r>
-              <a:rPr lang="en-US" smtClean="0"/>
+              <a:rPr lang="en-US"/>
               <a:t>Fourth level</a:t>
             </a:r>
           </a:p>
           <a:p>
             <a:pPr lvl="4"/>
             <a:r>
-              <a:rPr lang="en-US" smtClean="0"/>
+              <a:rPr lang="en-US"/>
               <a:t>Fifth level</a:t>
             </a:r>
-            <a:endParaRPr lang="en-US"/>
           </a:p>
         </p:txBody>
       </p:sp>
@@ -3677,7 +3661,7 @@
           <a:p>
             <a:fld id="{7FC8593D-7C47-471E-A8DF-97AC4FFD13F5}" type="datetimeFigureOut">
               <a:rPr lang="en-US" smtClean="0"/>
-              <a:t>11/21/2016</a:t>
+              <a:t>12/5/2016</a:t>
             </a:fld>
             <a:endParaRPr lang="en-US"/>
           </a:p>
@@ -3783,10 +3767,9 @@
           <a:lstStyle/>
           <a:p>
             <a:r>
-              <a:rPr lang="en-US" smtClean="0"/>
+              <a:rPr lang="en-US"/>
               <a:t>Click to edit Master title style</a:t>
             </a:r>
-            <a:endParaRPr lang="en-US"/>
           </a:p>
         </p:txBody>
       </p:sp>
@@ -3807,38 +3790,37 @@
           <a:p>
             <a:pPr lvl="0"/>
             <a:r>
-              <a:rPr lang="en-US" smtClean="0"/>
+              <a:rPr lang="en-US"/>
               <a:t>Click to edit Master text styles</a:t>
             </a:r>
           </a:p>
           <a:p>
             <a:pPr lvl="1"/>
             <a:r>
-              <a:rPr lang="en-US" smtClean="0"/>
+              <a:rPr lang="en-US"/>
               <a:t>Second level</a:t>
             </a:r>
           </a:p>
           <a:p>
             <a:pPr lvl="2"/>
             <a:r>
-              <a:rPr lang="en-US" smtClean="0"/>
+              <a:rPr lang="en-US"/>
               <a:t>Third level</a:t>
             </a:r>
           </a:p>
           <a:p>
             <a:pPr lvl="3"/>
             <a:r>
-              <a:rPr lang="en-US" smtClean="0"/>
+              <a:rPr lang="en-US"/>
               <a:t>Fourth level</a:t>
             </a:r>
           </a:p>
           <a:p>
             <a:pPr lvl="4"/>
             <a:r>
-              <a:rPr lang="en-US" smtClean="0"/>
+              <a:rPr lang="en-US"/>
               <a:t>Fifth level</a:t>
             </a:r>
-            <a:endParaRPr lang="en-US"/>
           </a:p>
         </p:txBody>
       </p:sp>
@@ -3859,7 +3841,7 @@
           <a:p>
             <a:fld id="{7FC8593D-7C47-471E-A8DF-97AC4FFD13F5}" type="datetimeFigureOut">
               <a:rPr lang="en-US" smtClean="0"/>
-              <a:t>11/21/2016</a:t>
+              <a:t>12/5/2016</a:t>
             </a:fld>
             <a:endParaRPr lang="en-US"/>
           </a:p>
@@ -4005,10 +3987,9 @@
           </a:lstStyle>
           <a:p>
             <a:r>
-              <a:rPr lang="en-US" smtClean="0"/>
+              <a:rPr lang="en-US"/>
               <a:t>Click to edit Master title style</a:t>
             </a:r>
-            <a:endParaRPr lang="en-US"/>
           </a:p>
         </p:txBody>
       </p:sp>
@@ -4129,7 +4110,7 @@
           <a:p>
             <a:pPr lvl="0"/>
             <a:r>
-              <a:rPr lang="en-US" smtClean="0"/>
+              <a:rPr lang="en-US"/>
               <a:t>Click to edit Master text styles</a:t>
             </a:r>
           </a:p>
@@ -4193,10 +4174,9 @@
           <a:lstStyle/>
           <a:p>
             <a:r>
-              <a:rPr lang="en-US" smtClean="0"/>
+              <a:rPr lang="en-US"/>
               <a:t>Click to edit Master title style</a:t>
             </a:r>
-            <a:endParaRPr lang="en-US"/>
           </a:p>
         </p:txBody>
       </p:sp>
@@ -4222,35 +4202,35 @@
           <a:p>
             <a:pPr lvl="0"/>
             <a:r>
-              <a:rPr lang="en-US" smtClean="0"/>
+              <a:rPr lang="en-US"/>
               <a:t>Click to edit Master text styles</a:t>
             </a:r>
           </a:p>
           <a:p>
             <a:pPr lvl="1"/>
             <a:r>
-              <a:rPr lang="en-US" smtClean="0"/>
+              <a:rPr lang="en-US"/>
               <a:t>Second level</a:t>
             </a:r>
           </a:p>
           <a:p>
             <a:pPr lvl="2"/>
             <a:r>
-              <a:rPr lang="en-US" smtClean="0"/>
+              <a:rPr lang="en-US"/>
               <a:t>Third level</a:t>
             </a:r>
           </a:p>
           <a:p>
             <a:pPr lvl="3"/>
             <a:r>
-              <a:rPr lang="en-US" smtClean="0"/>
+              <a:rPr lang="en-US"/>
               <a:t>Fourth level</a:t>
             </a:r>
           </a:p>
           <a:p>
             <a:pPr lvl="4"/>
             <a:r>
-              <a:rPr lang="en-US" smtClean="0"/>
+              <a:rPr lang="en-US"/>
               <a:t>Fifth level</a:t>
             </a:r>
             <a:endParaRPr lang="en-US" dirty="0"/>
@@ -4279,38 +4259,37 @@
           <a:p>
             <a:pPr lvl="0"/>
             <a:r>
-              <a:rPr lang="en-US" smtClean="0"/>
+              <a:rPr lang="en-US"/>
               <a:t>Click to edit Master text styles</a:t>
             </a:r>
           </a:p>
           <a:p>
             <a:pPr lvl="1"/>
             <a:r>
-              <a:rPr lang="en-US" smtClean="0"/>
+              <a:rPr lang="en-US"/>
               <a:t>Second level</a:t>
             </a:r>
           </a:p>
           <a:p>
             <a:pPr lvl="2"/>
             <a:r>
-              <a:rPr lang="en-US" smtClean="0"/>
+              <a:rPr lang="en-US"/>
               <a:t>Third level</a:t>
             </a:r>
           </a:p>
           <a:p>
             <a:pPr lvl="3"/>
             <a:r>
-              <a:rPr lang="en-US" smtClean="0"/>
+              <a:rPr lang="en-US"/>
               <a:t>Fourth level</a:t>
             </a:r>
           </a:p>
           <a:p>
             <a:pPr lvl="4"/>
             <a:r>
-              <a:rPr lang="en-US" smtClean="0"/>
+              <a:rPr lang="en-US"/>
               <a:t>Fifth level</a:t>
             </a:r>
-            <a:endParaRPr lang="en-US"/>
           </a:p>
         </p:txBody>
       </p:sp>
@@ -4331,7 +4310,7 @@
           <a:p>
             <a:fld id="{7FC8593D-7C47-471E-A8DF-97AC4FFD13F5}" type="datetimeFigureOut">
               <a:rPr lang="en-US" smtClean="0"/>
-              <a:t>11/21/2016</a:t>
+              <a:t>12/5/2016</a:t>
             </a:fld>
             <a:endParaRPr lang="en-US"/>
           </a:p>
@@ -4437,10 +4416,9 @@
           <a:lstStyle/>
           <a:p>
             <a:r>
-              <a:rPr lang="en-US" smtClean="0"/>
+              <a:rPr lang="en-US"/>
               <a:t>Click to edit Master title style</a:t>
             </a:r>
-            <a:endParaRPr lang="en-US"/>
           </a:p>
         </p:txBody>
       </p:sp>
@@ -4515,7 +4493,7 @@
           <a:p>
             <a:pPr lvl="0"/>
             <a:r>
-              <a:rPr lang="en-US" smtClean="0"/>
+              <a:rPr lang="en-US"/>
               <a:t>Click to edit Master text styles</a:t>
             </a:r>
           </a:p>
@@ -4543,35 +4521,35 @@
           <a:p>
             <a:pPr lvl="0"/>
             <a:r>
-              <a:rPr lang="en-US" smtClean="0"/>
+              <a:rPr lang="en-US"/>
               <a:t>Click to edit Master text styles</a:t>
             </a:r>
           </a:p>
           <a:p>
             <a:pPr lvl="1"/>
             <a:r>
-              <a:rPr lang="en-US" smtClean="0"/>
+              <a:rPr lang="en-US"/>
               <a:t>Second level</a:t>
             </a:r>
           </a:p>
           <a:p>
             <a:pPr lvl="2"/>
             <a:r>
-              <a:rPr lang="en-US" smtClean="0"/>
+              <a:rPr lang="en-US"/>
               <a:t>Third level</a:t>
             </a:r>
           </a:p>
           <a:p>
             <a:pPr lvl="3"/>
             <a:r>
-              <a:rPr lang="en-US" smtClean="0"/>
+              <a:rPr lang="en-US"/>
               <a:t>Fourth level</a:t>
             </a:r>
           </a:p>
           <a:p>
             <a:pPr lvl="4"/>
             <a:r>
-              <a:rPr lang="en-US" smtClean="0"/>
+              <a:rPr lang="en-US"/>
               <a:t>Fifth level</a:t>
             </a:r>
             <a:endParaRPr lang="en-US" dirty="0"/>
@@ -4649,7 +4627,7 @@
           <a:p>
             <a:pPr lvl="0"/>
             <a:r>
-              <a:rPr lang="en-US" smtClean="0"/>
+              <a:rPr lang="en-US"/>
               <a:t>Click to edit Master text styles</a:t>
             </a:r>
           </a:p>
@@ -4677,35 +4655,35 @@
           <a:p>
             <a:pPr lvl="0"/>
             <a:r>
-              <a:rPr lang="en-US" smtClean="0"/>
+              <a:rPr lang="en-US"/>
               <a:t>Click to edit Master text styles</a:t>
             </a:r>
           </a:p>
           <a:p>
             <a:pPr lvl="1"/>
             <a:r>
-              <a:rPr lang="en-US" smtClean="0"/>
+              <a:rPr lang="en-US"/>
               <a:t>Second level</a:t>
             </a:r>
           </a:p>
           <a:p>
             <a:pPr lvl="2"/>
             <a:r>
-              <a:rPr lang="en-US" smtClean="0"/>
+              <a:rPr lang="en-US"/>
               <a:t>Third level</a:t>
             </a:r>
           </a:p>
           <a:p>
             <a:pPr lvl="3"/>
             <a:r>
-              <a:rPr lang="en-US" smtClean="0"/>
+              <a:rPr lang="en-US"/>
               <a:t>Fourth level</a:t>
             </a:r>
           </a:p>
           <a:p>
             <a:pPr lvl="4"/>
             <a:r>
-              <a:rPr lang="en-US" smtClean="0"/>
+              <a:rPr lang="en-US"/>
               <a:t>Fifth level</a:t>
             </a:r>
             <a:endParaRPr lang="en-US" dirty="0"/>
@@ -4729,7 +4707,7 @@
           <a:p>
             <a:fld id="{7FC8593D-7C47-471E-A8DF-97AC4FFD13F5}" type="datetimeFigureOut">
               <a:rPr lang="en-US" smtClean="0"/>
-              <a:t>11/21/2016</a:t>
+              <a:t>12/5/2016</a:t>
             </a:fld>
             <a:endParaRPr lang="en-US"/>
           </a:p>
@@ -4835,10 +4813,9 @@
           <a:lstStyle/>
           <a:p>
             <a:r>
-              <a:rPr lang="en-US" smtClean="0"/>
+              <a:rPr lang="en-US"/>
               <a:t>Click to edit Master title style</a:t>
             </a:r>
-            <a:endParaRPr lang="en-US"/>
           </a:p>
         </p:txBody>
       </p:sp>
@@ -4859,7 +4836,7 @@
           <a:p>
             <a:fld id="{7FC8593D-7C47-471E-A8DF-97AC4FFD13F5}" type="datetimeFigureOut">
               <a:rPr lang="en-US" smtClean="0"/>
-              <a:t>11/21/2016</a:t>
+              <a:t>12/5/2016</a:t>
             </a:fld>
             <a:endParaRPr lang="en-US"/>
           </a:p>
@@ -4966,7 +4943,7 @@
           <a:p>
             <a:fld id="{7FC8593D-7C47-471E-A8DF-97AC4FFD13F5}" type="datetimeFigureOut">
               <a:rPr lang="en-US" smtClean="0"/>
-              <a:t>11/21/2016</a:t>
+              <a:t>12/5/2016</a:t>
             </a:fld>
             <a:endParaRPr lang="en-US"/>
           </a:p>
@@ -5076,10 +5053,9 @@
           </a:lstStyle>
           <a:p>
             <a:r>
-              <a:rPr lang="en-US" smtClean="0"/>
+              <a:rPr lang="en-US"/>
               <a:t>Click to edit Master title style</a:t>
             </a:r>
-            <a:endParaRPr lang="en-US"/>
           </a:p>
         </p:txBody>
       </p:sp>
@@ -5135,35 +5111,35 @@
           <a:p>
             <a:pPr lvl="0"/>
             <a:r>
-              <a:rPr lang="en-US" smtClean="0"/>
+              <a:rPr lang="en-US"/>
               <a:t>Click to edit Master text styles</a:t>
             </a:r>
           </a:p>
           <a:p>
             <a:pPr lvl="1"/>
             <a:r>
-              <a:rPr lang="en-US" smtClean="0"/>
+              <a:rPr lang="en-US"/>
               <a:t>Second level</a:t>
             </a:r>
           </a:p>
           <a:p>
             <a:pPr lvl="2"/>
             <a:r>
-              <a:rPr lang="en-US" smtClean="0"/>
+              <a:rPr lang="en-US"/>
               <a:t>Third level</a:t>
             </a:r>
           </a:p>
           <a:p>
             <a:pPr lvl="3"/>
             <a:r>
-              <a:rPr lang="en-US" smtClean="0"/>
+              <a:rPr lang="en-US"/>
               <a:t>Fourth level</a:t>
             </a:r>
           </a:p>
           <a:p>
             <a:pPr lvl="4"/>
             <a:r>
-              <a:rPr lang="en-US" smtClean="0"/>
+              <a:rPr lang="en-US"/>
               <a:t>Fifth level</a:t>
             </a:r>
             <a:endParaRPr lang="en-US" dirty="0"/>
@@ -5234,7 +5210,7 @@
           <a:p>
             <a:pPr lvl="0"/>
             <a:r>
-              <a:rPr lang="en-US" smtClean="0"/>
+              <a:rPr lang="en-US"/>
               <a:t>Click to edit Master text styles</a:t>
             </a:r>
           </a:p>
@@ -5257,7 +5233,7 @@
           <a:p>
             <a:fld id="{7FC8593D-7C47-471E-A8DF-97AC4FFD13F5}" type="datetimeFigureOut">
               <a:rPr lang="en-US" smtClean="0"/>
-              <a:t>11/21/2016</a:t>
+              <a:t>12/5/2016</a:t>
             </a:fld>
             <a:endParaRPr lang="en-US"/>
           </a:p>
@@ -5367,10 +5343,9 @@
           </a:lstStyle>
           <a:p>
             <a:r>
-              <a:rPr lang="en-US" smtClean="0"/>
+              <a:rPr lang="en-US"/>
               <a:t>Click to edit Master title style</a:t>
             </a:r>
-            <a:endParaRPr lang="en-US"/>
           </a:p>
         </p:txBody>
       </p:sp>
@@ -5438,7 +5413,7 @@
           <a:p>
             <a:pPr lvl="0"/>
             <a:r>
-              <a:rPr lang="en-US" smtClean="0"/>
+              <a:rPr lang="en-US"/>
               <a:t>Click to edit Master text styles</a:t>
             </a:r>
           </a:p>
@@ -5461,7 +5436,7 @@
           <a:p>
             <a:fld id="{7FC8593D-7C47-471E-A8DF-97AC4FFD13F5}" type="datetimeFigureOut">
               <a:rPr lang="en-US" smtClean="0"/>
-              <a:t>11/21/2016</a:t>
+              <a:t>12/5/2016</a:t>
             </a:fld>
             <a:endParaRPr lang="en-US"/>
           </a:p>
@@ -5749,10 +5724,9 @@
           </a:lstStyle>
           <a:p>
             <a:r>
-              <a:rPr lang="en-US" smtClean="0"/>
+              <a:rPr lang="en-US"/>
               <a:t>Click icon to add picture</a:t>
             </a:r>
-            <a:endParaRPr lang="en-US"/>
           </a:p>
         </p:txBody>
       </p:sp>
@@ -5858,10 +5832,9 @@
           <a:lstStyle/>
           <a:p>
             <a:r>
-              <a:rPr lang="en-US" smtClean="0"/>
+              <a:rPr lang="en-US"/>
               <a:t>Click to edit Master title style</a:t>
             </a:r>
-            <a:endParaRPr lang="en-US"/>
           </a:p>
         </p:txBody>
       </p:sp>
@@ -5892,38 +5865,38 @@
           <a:p>
             <a:pPr lvl="0"/>
             <a:r>
-              <a:rPr lang="en-US" smtClean="0"/>
+              <a:rPr lang="en-US"/>
               <a:t>Click to edit Master text styles</a:t>
             </a:r>
           </a:p>
           <a:p>
             <a:pPr lvl="1"/>
             <a:r>
-              <a:rPr lang="en-US" smtClean="0"/>
+              <a:rPr lang="en-US"/>
               <a:t>Second level</a:t>
             </a:r>
           </a:p>
           <a:p>
             <a:pPr lvl="2"/>
             <a:r>
-              <a:rPr lang="en-US" smtClean="0"/>
+              <a:rPr lang="en-US"/>
               <a:t>Third level</a:t>
             </a:r>
           </a:p>
           <a:p>
             <a:pPr lvl="3"/>
             <a:r>
-              <a:rPr lang="en-US" smtClean="0"/>
+              <a:rPr lang="en-US"/>
               <a:t>Fourth level</a:t>
             </a:r>
           </a:p>
           <a:p>
             <a:pPr lvl="4"/>
             <a:r>
-              <a:rPr lang="en-US" smtClean="0"/>
+              <a:rPr lang="en-US"/>
               <a:t>Fifth level</a:t>
             </a:r>
-            <a:endParaRPr lang="en-US" dirty="0" smtClean="0"/>
+            <a:endParaRPr lang="en-US" dirty="0"/>
           </a:p>
         </p:txBody>
       </p:sp>
@@ -5961,7 +5934,7 @@
             <a:fld id="{7FC8593D-7C47-471E-A8DF-97AC4FFD13F5}" type="datetimeFigureOut">
               <a:rPr lang="en-US" smtClean="0"/>
               <a:pPr/>
-              <a:t>11/21/2016</a:t>
+              <a:t>12/5/2016</a:t>
             </a:fld>
             <a:endParaRPr lang="en-US" dirty="0"/>
           </a:p>
@@ -6412,7 +6385,7 @@
           <a:lstStyle/>
           <a:p>
             <a:r>
-              <a:rPr lang="en-US" sz="8000" b="1" dirty="0" smtClean="0">
+              <a:rPr lang="en-US" sz="8000" b="1" dirty="0">
                 <a:solidFill>
                   <a:schemeClr val="accent2"/>
                 </a:solidFill>
@@ -6420,12 +6393,6 @@
               </a:rPr>
               <a:t>Kiddo</a:t>
             </a:r>
-            <a:endParaRPr lang="en-US" sz="8000" b="1" dirty="0">
-              <a:solidFill>
-                <a:schemeClr val="accent2"/>
-              </a:solidFill>
-              <a:latin typeface="Comic Sans MS" panose="030F0702030302020204" pitchFamily="66" charset="0"/>
-            </a:endParaRPr>
           </a:p>
         </p:txBody>
       </p:sp>
@@ -6483,13 +6450,6 @@
       </p:transition>
     </mc:Fallback>
   </mc:AlternateContent>
-  <p:timing>
-    <p:tnLst>
-      <p:par>
-        <p:cTn id="1" dur="indefinite" restart="never" nodeType="tmRoot"/>
-      </p:par>
-    </p:tnLst>
-  </p:timing>
 </p:sld>
 </file>
 
@@ -6526,16 +6486,12 @@
           <a:lstStyle/>
           <a:p>
             <a:r>
-              <a:rPr lang="en-US" b="1" dirty="0" smtClean="0">
+              <a:rPr lang="en-US" b="1" dirty="0">
                 <a:latin typeface="Adobe Fan Heiti Std B" panose="020B0700000000000000" pitchFamily="34" charset="-128"/>
                 <a:ea typeface="Adobe Fan Heiti Std B" panose="020B0700000000000000" pitchFamily="34" charset="-128"/>
               </a:rPr>
               <a:t>What is Kiddo?</a:t>
             </a:r>
-            <a:endParaRPr lang="en-US" b="1" dirty="0">
-              <a:latin typeface="Adobe Fan Heiti Std B" panose="020B0700000000000000" pitchFamily="34" charset="-128"/>
-              <a:ea typeface="Adobe Fan Heiti Std B" panose="020B0700000000000000" pitchFamily="34" charset="-128"/>
-            </a:endParaRPr>
           </a:p>
         </p:txBody>
       </p:sp>
@@ -6584,33 +6540,17 @@
                 <a:latin typeface="Adobe Fan Heiti Std B" panose="020B0700000000000000" pitchFamily="34" charset="-128"/>
                 <a:ea typeface="Adobe Fan Heiti Std B" panose="020B0700000000000000" pitchFamily="34" charset="-128"/>
               </a:rPr>
-              <a:t>Teachers </a:t>
-            </a:r>
-            <a:r>
-              <a:rPr lang="en-US" sz="2400" dirty="0" smtClean="0">
-                <a:latin typeface="Adobe Fan Heiti Std B" panose="020B0700000000000000" pitchFamily="34" charset="-128"/>
-                <a:ea typeface="Adobe Fan Heiti Std B" panose="020B0700000000000000" pitchFamily="34" charset="-128"/>
-              </a:rPr>
-              <a:t>use </a:t>
-            </a:r>
+              <a:t>Teachers use our app to post class and student-specific updates to approved parents</a:t>
+            </a:r>
+          </a:p>
+          <a:p>
             <a:r>
               <a:rPr lang="en-US" sz="2400" dirty="0">
                 <a:latin typeface="Adobe Fan Heiti Std B" panose="020B0700000000000000" pitchFamily="34" charset="-128"/>
                 <a:ea typeface="Adobe Fan Heiti Std B" panose="020B0700000000000000" pitchFamily="34" charset="-128"/>
               </a:rPr>
-              <a:t>our app to post class and student-specific updates to </a:t>
-            </a:r>
-            <a:r>
-              <a:rPr lang="en-US" sz="2400" dirty="0" smtClean="0">
-                <a:latin typeface="Adobe Fan Heiti Std B" panose="020B0700000000000000" pitchFamily="34" charset="-128"/>
-                <a:ea typeface="Adobe Fan Heiti Std B" panose="020B0700000000000000" pitchFamily="34" charset="-128"/>
-              </a:rPr>
-              <a:t>approved parents</a:t>
-            </a:r>
-            <a:endParaRPr lang="en-US" sz="2400" dirty="0">
-              <a:latin typeface="Adobe Fan Heiti Std B" panose="020B0700000000000000" pitchFamily="34" charset="-128"/>
-              <a:ea typeface="Adobe Fan Heiti Std B" panose="020B0700000000000000" pitchFamily="34" charset="-128"/>
-            </a:endParaRPr>
+              <a:t>Parents view these updates in the app and follow-up with the teachers via a private chat</a:t>
+            </a:r>
           </a:p>
           <a:p>
             <a:r>
@@ -6618,42 +6558,8 @@
                 <a:latin typeface="Adobe Fan Heiti Std B" panose="020B0700000000000000" pitchFamily="34" charset="-128"/>
                 <a:ea typeface="Adobe Fan Heiti Std B" panose="020B0700000000000000" pitchFamily="34" charset="-128"/>
               </a:rPr>
-              <a:t>Parents </a:t>
-            </a:r>
-            <a:r>
-              <a:rPr lang="en-US" sz="2400" dirty="0" smtClean="0">
-                <a:latin typeface="Adobe Fan Heiti Std B" panose="020B0700000000000000" pitchFamily="34" charset="-128"/>
-                <a:ea typeface="Adobe Fan Heiti Std B" panose="020B0700000000000000" pitchFamily="34" charset="-128"/>
-              </a:rPr>
-              <a:t>view </a:t>
-            </a:r>
-            <a:r>
-              <a:rPr lang="en-US" sz="2400" dirty="0">
-                <a:latin typeface="Adobe Fan Heiti Std B" panose="020B0700000000000000" pitchFamily="34" charset="-128"/>
-                <a:ea typeface="Adobe Fan Heiti Std B" panose="020B0700000000000000" pitchFamily="34" charset="-128"/>
-              </a:rPr>
-              <a:t>these updates in the app and follow-up with the teachers via a private </a:t>
-            </a:r>
-            <a:r>
-              <a:rPr lang="en-US" sz="2400" dirty="0" smtClean="0">
-                <a:latin typeface="Adobe Fan Heiti Std B" panose="020B0700000000000000" pitchFamily="34" charset="-128"/>
-                <a:ea typeface="Adobe Fan Heiti Std B" panose="020B0700000000000000" pitchFamily="34" charset="-128"/>
-              </a:rPr>
-              <a:t>chat</a:t>
-            </a:r>
-          </a:p>
-          <a:p>
-            <a:r>
-              <a:rPr lang="en-US" sz="2400" dirty="0" smtClean="0">
-                <a:latin typeface="Adobe Fan Heiti Std B" panose="020B0700000000000000" pitchFamily="34" charset="-128"/>
-                <a:ea typeface="Adobe Fan Heiti Std B" panose="020B0700000000000000" pitchFamily="34" charset="-128"/>
-              </a:rPr>
               <a:t>The administrator controls the creation and deletion of teacher accounts and classes to prevent phony teachers and classes from being created by anyone for their school</a:t>
             </a:r>
-            <a:endParaRPr lang="en-US" sz="2400" dirty="0">
-              <a:latin typeface="Adobe Fan Heiti Std B" panose="020B0700000000000000" pitchFamily="34" charset="-128"/>
-              <a:ea typeface="Adobe Fan Heiti Std B" panose="020B0700000000000000" pitchFamily="34" charset="-128"/>
-            </a:endParaRPr>
           </a:p>
           <a:p>
             <a:pPr marL="0" indent="0">
@@ -6717,224 +6623,18 @@
         </p:nvSpPr>
         <p:spPr/>
         <p:txBody>
-          <a:bodyPr/>
-          <a:lstStyle/>
-          <a:p>
-            <a:r>
-              <a:rPr lang="en-US" dirty="0" smtClean="0">
-                <a:latin typeface="Adobe Fan Heiti Std B" panose="020B0700000000000000" pitchFamily="34" charset="-128"/>
-                <a:ea typeface="Adobe Fan Heiti Std B" panose="020B0700000000000000" pitchFamily="34" charset="-128"/>
-              </a:rPr>
-              <a:t>Why Kiddo?</a:t>
-            </a:r>
-            <a:endParaRPr lang="en-US" dirty="0">
-              <a:latin typeface="Adobe Fan Heiti Std B" panose="020B0700000000000000" pitchFamily="34" charset="-128"/>
-              <a:ea typeface="Adobe Fan Heiti Std B" panose="020B0700000000000000" pitchFamily="34" charset="-128"/>
-            </a:endParaRPr>
-          </a:p>
-        </p:txBody>
-      </p:sp>
-      <p:sp>
-        <p:nvSpPr>
-          <p:cNvPr id="4" name="TextBox 3"/>
-          <p:cNvSpPr txBox="1"/>
-          <p:nvPr/>
-        </p:nvSpPr>
-        <p:spPr>
-          <a:xfrm>
-            <a:off x="1378968" y="1628800"/>
-            <a:ext cx="9289032" cy="3776931"/>
-          </a:xfrm>
-          <a:prstGeom prst="rect">
-            <a:avLst/>
-          </a:prstGeom>
-          <a:noFill/>
-        </p:spPr>
-        <p:txBody>
-          <a:bodyPr wrap="square" rtlCol="0">
-            <a:spAutoFit/>
-          </a:bodyPr>
-          <a:lstStyle/>
-          <a:p>
-            <a:pPr marL="228600" indent="-228600">
-              <a:lnSpc>
-                <a:spcPct val="90000"/>
-              </a:lnSpc>
-              <a:spcBef>
-                <a:spcPts val="1800"/>
-              </a:spcBef>
-              <a:buFont typeface="Arial" panose="020B0604020202020204" pitchFamily="34" charset="0"/>
-              <a:buChar char="•"/>
-            </a:pPr>
-            <a:r>
-              <a:rPr lang="en-CA" sz="2000" dirty="0">
-                <a:latin typeface="Adobe Fan Heiti Std B" panose="020B0700000000000000" pitchFamily="34" charset="-128"/>
-                <a:ea typeface="Adobe Fan Heiti Std B" panose="020B0700000000000000" pitchFamily="34" charset="-128"/>
-              </a:rPr>
-              <a:t>P</a:t>
-            </a:r>
-            <a:r>
-              <a:rPr lang="en-US" sz="2400" dirty="0" err="1">
-                <a:latin typeface="Adobe Fan Heiti Std B" panose="020B0700000000000000" pitchFamily="34" charset="-128"/>
-                <a:ea typeface="Adobe Fan Heiti Std B" panose="020B0700000000000000" pitchFamily="34" charset="-128"/>
-              </a:rPr>
-              <a:t>rovides</a:t>
-            </a:r>
-            <a:r>
-              <a:rPr lang="en-US" sz="2400" dirty="0">
-                <a:latin typeface="Adobe Fan Heiti Std B" panose="020B0700000000000000" pitchFamily="34" charset="-128"/>
-                <a:ea typeface="Adobe Fan Heiti Std B" panose="020B0700000000000000" pitchFamily="34" charset="-128"/>
-              </a:rPr>
-              <a:t> </a:t>
-            </a:r>
-            <a:r>
-              <a:rPr lang="en-US" sz="2400" dirty="0">
-                <a:latin typeface="Adobe Fan Heiti Std B" panose="020B0700000000000000" pitchFamily="34" charset="-128"/>
-                <a:ea typeface="Adobe Fan Heiti Std B" panose="020B0700000000000000" pitchFamily="34" charset="-128"/>
-              </a:rPr>
-              <a:t>a centralized platform for school updates and notifications</a:t>
-            </a:r>
-            <a:r>
-              <a:rPr lang="en-CA" sz="2400" dirty="0">
-                <a:latin typeface="Adobe Fan Heiti Std B" panose="020B0700000000000000" pitchFamily="34" charset="-128"/>
-                <a:ea typeface="Adobe Fan Heiti Std B" panose="020B0700000000000000" pitchFamily="34" charset="-128"/>
-              </a:rPr>
-              <a:t> </a:t>
-            </a:r>
-          </a:p>
-          <a:p>
-            <a:pPr marL="228600" indent="-228600">
-              <a:lnSpc>
-                <a:spcPct val="90000"/>
-              </a:lnSpc>
-              <a:spcBef>
-                <a:spcPts val="1800"/>
-              </a:spcBef>
-              <a:buFont typeface="Arial" panose="020B0604020202020204" pitchFamily="34" charset="0"/>
-              <a:buChar char="•"/>
-            </a:pPr>
-            <a:r>
-              <a:rPr lang="en-CA" sz="2400" dirty="0">
-                <a:latin typeface="Adobe Fan Heiti Std B" panose="020B0700000000000000" pitchFamily="34" charset="-128"/>
-                <a:ea typeface="Adobe Fan Heiti Std B" panose="020B0700000000000000" pitchFamily="34" charset="-128"/>
-              </a:rPr>
-              <a:t>Makes it easier for parents to view updates about their children and stay informed about what is happening at school</a:t>
-            </a:r>
-          </a:p>
-          <a:p>
-            <a:pPr marL="228600" indent="-228600">
-              <a:lnSpc>
-                <a:spcPct val="90000"/>
-              </a:lnSpc>
-              <a:spcBef>
-                <a:spcPts val="1800"/>
-              </a:spcBef>
-              <a:buFont typeface="Arial" panose="020B0604020202020204" pitchFamily="34" charset="0"/>
-              <a:buChar char="•"/>
-            </a:pPr>
-            <a:r>
-              <a:rPr lang="en-CA" sz="2400" dirty="0">
-                <a:latin typeface="Adobe Fan Heiti Std B" panose="020B0700000000000000" pitchFamily="34" charset="-128"/>
-                <a:ea typeface="Adobe Fan Heiti Std B" panose="020B0700000000000000" pitchFamily="34" charset="-128"/>
-              </a:rPr>
-              <a:t>Makes it easier for teachers to share class updates, particularly photos and videos</a:t>
-            </a:r>
-          </a:p>
-          <a:p>
-            <a:pPr marL="228600" indent="-228600">
-              <a:lnSpc>
-                <a:spcPct val="90000"/>
-              </a:lnSpc>
-              <a:spcBef>
-                <a:spcPts val="1800"/>
-              </a:spcBef>
-              <a:buFont typeface="Arial" panose="020B0604020202020204" pitchFamily="34" charset="0"/>
-              <a:buChar char="•"/>
-            </a:pPr>
-            <a:r>
-              <a:rPr lang="en-CA" sz="2400" dirty="0">
-                <a:latin typeface="Adobe Fan Heiti Std B" panose="020B0700000000000000" pitchFamily="34" charset="-128"/>
-                <a:ea typeface="Adobe Fan Heiti Std B" panose="020B0700000000000000" pitchFamily="34" charset="-128"/>
-              </a:rPr>
-              <a:t>It is secure since teachers must approve parents and the administrator controls the creation of teacher accounts and their classes</a:t>
-            </a:r>
-            <a:endParaRPr lang="en-CA" sz="2400" dirty="0">
-              <a:latin typeface="Adobe Fan Heiti Std B" panose="020B0700000000000000" pitchFamily="34" charset="-128"/>
-              <a:ea typeface="Adobe Fan Heiti Std B" panose="020B0700000000000000" pitchFamily="34" charset="-128"/>
-            </a:endParaRPr>
-          </a:p>
-        </p:txBody>
-      </p:sp>
-    </p:spTree>
-    <p:extLst>
-      <p:ext uri="{BB962C8B-B14F-4D97-AF65-F5344CB8AC3E}">
-        <p14:creationId xmlns:p14="http://schemas.microsoft.com/office/powerpoint/2010/main" val="3093572411"/>
-      </p:ext>
-    </p:extLst>
-  </p:cSld>
-  <p:clrMapOvr>
-    <a:masterClrMapping/>
-  </p:clrMapOvr>
-  <mc:AlternateContent xmlns:mc="http://schemas.openxmlformats.org/markup-compatibility/2006" xmlns:p14="http://schemas.microsoft.com/office/powerpoint/2010/main">
-    <mc:Choice Requires="p14">
-      <p:transition spd="med" p14:dur="700">
-        <p:fade/>
-      </p:transition>
-    </mc:Choice>
-    <mc:Fallback xmlns="">
-      <p:transition spd="med">
-        <p:fade/>
-      </p:transition>
-    </mc:Fallback>
-  </mc:AlternateContent>
-</p:sld>
-</file>
-
-<file path=ppt/slides/slide4.xml><?xml version="1.0" encoding="utf-8"?>
-<p:sld xmlns:a="http://schemas.openxmlformats.org/drawingml/2006/main" xmlns:r="http://schemas.openxmlformats.org/officeDocument/2006/relationships" xmlns:p="http://schemas.openxmlformats.org/presentationml/2006/main">
-  <p:cSld>
-    <p:spTree>
-      <p:nvGrpSpPr>
-        <p:cNvPr id="1" name=""/>
-        <p:cNvGrpSpPr/>
-        <p:nvPr/>
-      </p:nvGrpSpPr>
-      <p:grpSpPr>
-        <a:xfrm>
-          <a:off x="0" y="0"/>
-          <a:ext cx="0" cy="0"/>
-          <a:chOff x="0" y="0"/>
-          <a:chExt cx="0" cy="0"/>
-        </a:xfrm>
-      </p:grpSpPr>
-      <p:sp>
-        <p:nvSpPr>
-          <p:cNvPr id="2" name="Title 1"/>
-          <p:cNvSpPr>
-            <a:spLocks noGrp="1"/>
-          </p:cNvSpPr>
-          <p:nvPr>
-            <p:ph type="title"/>
-          </p:nvPr>
-        </p:nvSpPr>
-        <p:spPr/>
-        <p:txBody>
           <a:bodyPr>
             <a:normAutofit/>
           </a:bodyPr>
           <a:lstStyle/>
           <a:p>
             <a:r>
-              <a:rPr lang="en-US" sz="4400" dirty="0" smtClean="0">
+              <a:rPr lang="en-US" sz="4400" dirty="0">
                 <a:latin typeface="Adobe Fan Heiti Std B" panose="020B0700000000000000" pitchFamily="34" charset="-128"/>
                 <a:ea typeface="Adobe Fan Heiti Std B" panose="020B0700000000000000" pitchFamily="34" charset="-128"/>
               </a:rPr>
               <a:t>Who?</a:t>
             </a:r>
-            <a:endParaRPr lang="en-US" sz="4400" dirty="0">
-              <a:latin typeface="Adobe Fan Heiti Std B" panose="020B0700000000000000" pitchFamily="34" charset="-128"/>
-              <a:ea typeface="Adobe Fan Heiti Std B" panose="020B0700000000000000" pitchFamily="34" charset="-128"/>
-            </a:endParaRPr>
           </a:p>
         </p:txBody>
       </p:sp>
@@ -6959,7 +6659,7 @@
           <a:lstStyle/>
           <a:p>
             <a:r>
-              <a:rPr lang="en-US" sz="2800" b="1" dirty="0" smtClean="0">
+              <a:rPr lang="en-US" sz="2800" b="1" dirty="0">
                 <a:latin typeface="Adobe Fan Heiti Std B" panose="020B0700000000000000" pitchFamily="34" charset="-128"/>
                 <a:ea typeface="Adobe Fan Heiti Std B" panose="020B0700000000000000" pitchFamily="34" charset="-128"/>
               </a:rPr>
@@ -6972,7 +6672,7 @@
               <a:buChar char="•"/>
             </a:pPr>
             <a:r>
-              <a:rPr lang="en-US" dirty="0" smtClean="0">
+              <a:rPr lang="en-US" dirty="0">
                 <a:latin typeface="Adobe Fan Heiti Std B" panose="020B0700000000000000" pitchFamily="34" charset="-128"/>
                 <a:ea typeface="Adobe Fan Heiti Std B" panose="020B0700000000000000" pitchFamily="34" charset="-128"/>
               </a:rPr>
@@ -6985,7 +6685,7 @@
               <a:buChar char="•"/>
             </a:pPr>
             <a:r>
-              <a:rPr lang="en-US" dirty="0" smtClean="0">
+              <a:rPr lang="en-US" dirty="0">
                 <a:latin typeface="Adobe Fan Heiti Std B" panose="020B0700000000000000" pitchFamily="34" charset="-128"/>
                 <a:ea typeface="Adobe Fan Heiti Std B" panose="020B0700000000000000" pitchFamily="34" charset="-128"/>
               </a:rPr>
@@ -6998,7 +6698,7 @@
               <a:buChar char="•"/>
             </a:pPr>
             <a:r>
-              <a:rPr lang="en-US" dirty="0" smtClean="0">
+              <a:rPr lang="en-US" dirty="0">
                 <a:latin typeface="Adobe Fan Heiti Std B" panose="020B0700000000000000" pitchFamily="34" charset="-128"/>
                 <a:ea typeface="Adobe Fan Heiti Std B" panose="020B0700000000000000" pitchFamily="34" charset="-128"/>
               </a:rPr>
@@ -7011,7 +6711,7 @@
               <a:buChar char="•"/>
             </a:pPr>
             <a:r>
-              <a:rPr lang="en-US" dirty="0" smtClean="0">
+              <a:rPr lang="en-US" dirty="0">
                 <a:latin typeface="Adobe Fan Heiti Std B" panose="020B0700000000000000" pitchFamily="34" charset="-128"/>
                 <a:ea typeface="Adobe Fan Heiti Std B" panose="020B0700000000000000" pitchFamily="34" charset="-128"/>
               </a:rPr>
@@ -7069,7 +6769,7 @@
           <a:lstStyle/>
           <a:p>
             <a:r>
-              <a:rPr lang="en-US" sz="1200" b="1" i="1" dirty="0" smtClean="0">
+              <a:rPr lang="en-US" sz="1200" b="1" i="1" dirty="0">
                 <a:latin typeface="Arial" pitchFamily="34" charset="0"/>
                 <a:cs typeface="Arial" pitchFamily="34" charset="0"/>
               </a:rPr>
@@ -7078,7 +6778,7 @@
           </a:p>
           <a:p>
             <a:r>
-              <a:rPr lang="en-US" sz="1200" i="1" dirty="0" smtClean="0">
+              <a:rPr lang="en-US" sz="1200" i="1" dirty="0">
                 <a:latin typeface="Arial" pitchFamily="34" charset="0"/>
                 <a:cs typeface="Arial" pitchFamily="34" charset="0"/>
               </a:rPr>
@@ -7087,7 +6787,7 @@
           </a:p>
           <a:p>
             <a:r>
-              <a:rPr lang="en-US" sz="1200" i="1" dirty="0" smtClean="0">
+              <a:rPr lang="en-US" sz="1200" i="1" dirty="0">
                 <a:latin typeface="Arial" pitchFamily="34" charset="0"/>
                 <a:cs typeface="Arial" pitchFamily="34" charset="0"/>
               </a:rPr>
@@ -7142,17 +6842,10 @@
       </p:transition>
     </mc:Fallback>
   </mc:AlternateContent>
-  <p:timing>
-    <p:tnLst>
-      <p:par>
-        <p:cTn id="1" dur="indefinite" restart="never" nodeType="tmRoot"/>
-      </p:par>
-    </p:tnLst>
-  </p:timing>
 </p:sld>
 </file>
 
-<file path=ppt/slides/slide5.xml><?xml version="1.0" encoding="utf-8"?>
+<file path=ppt/slides/slide4.xml><?xml version="1.0" encoding="utf-8"?>
 <p:sld xmlns:a="http://schemas.openxmlformats.org/drawingml/2006/main" xmlns:r="http://schemas.openxmlformats.org/officeDocument/2006/relationships" xmlns:p="http://schemas.openxmlformats.org/presentationml/2006/main">
   <p:cSld>
     <p:spTree>
@@ -7187,16 +6880,12 @@
           <a:lstStyle/>
           <a:p>
             <a:r>
-              <a:rPr lang="en-US" sz="4400" dirty="0" smtClean="0">
+              <a:rPr lang="en-US" sz="4400" dirty="0">
                 <a:latin typeface="Adobe Fan Heiti Std B" panose="020B0700000000000000" pitchFamily="34" charset="-128"/>
                 <a:ea typeface="Adobe Fan Heiti Std B" panose="020B0700000000000000" pitchFamily="34" charset="-128"/>
               </a:rPr>
               <a:t>Who?</a:t>
             </a:r>
-            <a:endParaRPr lang="en-US" sz="4400" dirty="0">
-              <a:latin typeface="Adobe Fan Heiti Std B" panose="020B0700000000000000" pitchFamily="34" charset="-128"/>
-              <a:ea typeface="Adobe Fan Heiti Std B" panose="020B0700000000000000" pitchFamily="34" charset="-128"/>
-            </a:endParaRPr>
           </a:p>
         </p:txBody>
       </p:sp>
@@ -7221,7 +6910,7 @@
           <a:lstStyle/>
           <a:p>
             <a:r>
-              <a:rPr lang="en-US" sz="2800" b="1" dirty="0" smtClean="0">
+              <a:rPr lang="en-US" sz="2800" b="1" dirty="0">
                 <a:latin typeface="Adobe Fan Heiti Std B" panose="020B0700000000000000" pitchFamily="34" charset="-128"/>
                 <a:ea typeface="Adobe Fan Heiti Std B" panose="020B0700000000000000" pitchFamily="34" charset="-128"/>
               </a:rPr>
@@ -7234,7 +6923,7 @@
               <a:buChar char="•"/>
             </a:pPr>
             <a:r>
-              <a:rPr lang="en-US" dirty="0" smtClean="0">
+              <a:rPr lang="en-US" dirty="0">
                 <a:latin typeface="Adobe Fan Heiti Std B" panose="020B0700000000000000" pitchFamily="34" charset="-128"/>
                 <a:ea typeface="Adobe Fan Heiti Std B" panose="020B0700000000000000" pitchFamily="34" charset="-128"/>
               </a:rPr>
@@ -7247,7 +6936,7 @@
               <a:buChar char="•"/>
             </a:pPr>
             <a:r>
-              <a:rPr lang="en-US" dirty="0" smtClean="0">
+              <a:rPr lang="en-US" dirty="0">
                 <a:latin typeface="Adobe Fan Heiti Std B" panose="020B0700000000000000" pitchFamily="34" charset="-128"/>
                 <a:ea typeface="Adobe Fan Heiti Std B" panose="020B0700000000000000" pitchFamily="34" charset="-128"/>
               </a:rPr>
@@ -7260,7 +6949,7 @@
               <a:buChar char="•"/>
             </a:pPr>
             <a:r>
-              <a:rPr lang="en-US" dirty="0" smtClean="0">
+              <a:rPr lang="en-US" dirty="0">
                 <a:latin typeface="Adobe Fan Heiti Std B" panose="020B0700000000000000" pitchFamily="34" charset="-128"/>
                 <a:ea typeface="Adobe Fan Heiti Std B" panose="020B0700000000000000" pitchFamily="34" charset="-128"/>
               </a:rPr>
@@ -7318,7 +7007,7 @@
           <a:lstStyle/>
           <a:p>
             <a:r>
-              <a:rPr lang="en-US" sz="1200" b="1" i="1" dirty="0" smtClean="0">
+              <a:rPr lang="en-US" sz="1200" b="1" i="1" dirty="0">
                 <a:latin typeface="Arial" pitchFamily="34" charset="0"/>
                 <a:cs typeface="Arial" pitchFamily="34" charset="0"/>
               </a:rPr>
@@ -7327,7 +7016,7 @@
           </a:p>
           <a:p>
             <a:r>
-              <a:rPr lang="en-US" sz="1200" i="1" dirty="0" smtClean="0">
+              <a:rPr lang="en-US" sz="1200" i="1" dirty="0">
                 <a:latin typeface="Arial" pitchFamily="34" charset="0"/>
                 <a:cs typeface="Arial" pitchFamily="34" charset="0"/>
               </a:rPr>
@@ -7336,7 +7025,7 @@
           </a:p>
           <a:p>
             <a:r>
-              <a:rPr lang="en-US" sz="1200" i="1" dirty="0" smtClean="0">
+              <a:rPr lang="en-US" sz="1200" i="1" dirty="0">
                 <a:latin typeface="Arial" pitchFamily="34" charset="0"/>
                 <a:cs typeface="Arial" pitchFamily="34" charset="0"/>
               </a:rPr>
@@ -7391,17 +7080,10 @@
       </p:transition>
     </mc:Fallback>
   </mc:AlternateContent>
-  <p:timing>
-    <p:tnLst>
-      <p:par>
-        <p:cTn id="1" dur="indefinite" restart="never" nodeType="tmRoot"/>
-      </p:par>
-    </p:tnLst>
-  </p:timing>
 </p:sld>
 </file>
 
-<file path=ppt/slides/slide6.xml><?xml version="1.0" encoding="utf-8"?>
+<file path=ppt/slides/slide5.xml><?xml version="1.0" encoding="utf-8"?>
 <p:sld xmlns:a="http://schemas.openxmlformats.org/drawingml/2006/main" xmlns:r="http://schemas.openxmlformats.org/officeDocument/2006/relationships" xmlns:p="http://schemas.openxmlformats.org/presentationml/2006/main">
   <p:cSld>
     <p:spTree>
@@ -7436,16 +7118,12 @@
           <a:lstStyle/>
           <a:p>
             <a:r>
-              <a:rPr lang="en-US" sz="4400" dirty="0" smtClean="0">
+              <a:rPr lang="en-US" sz="4400" dirty="0">
                 <a:latin typeface="Adobe Fan Heiti Std B" panose="020B0700000000000000" pitchFamily="34" charset="-128"/>
                 <a:ea typeface="Adobe Fan Heiti Std B" panose="020B0700000000000000" pitchFamily="34" charset="-128"/>
               </a:rPr>
               <a:t>Who?</a:t>
             </a:r>
-            <a:endParaRPr lang="en-US" sz="4400" dirty="0">
-              <a:latin typeface="Adobe Fan Heiti Std B" panose="020B0700000000000000" pitchFamily="34" charset="-128"/>
-              <a:ea typeface="Adobe Fan Heiti Std B" panose="020B0700000000000000" pitchFamily="34" charset="-128"/>
-            </a:endParaRPr>
           </a:p>
         </p:txBody>
       </p:sp>
@@ -7470,7 +7148,7 @@
           <a:lstStyle/>
           <a:p>
             <a:r>
-              <a:rPr lang="en-US" sz="2800" b="1" dirty="0" smtClean="0">
+              <a:rPr lang="en-US" sz="2800" b="1" dirty="0">
                 <a:latin typeface="Adobe Fan Heiti Std B" panose="020B0700000000000000" pitchFamily="34" charset="-128"/>
                 <a:ea typeface="Adobe Fan Heiti Std B" panose="020B0700000000000000" pitchFamily="34" charset="-128"/>
               </a:rPr>
@@ -7483,7 +7161,7 @@
               <a:buChar char="•"/>
             </a:pPr>
             <a:r>
-              <a:rPr lang="en-US" dirty="0" smtClean="0">
+              <a:rPr lang="en-US" dirty="0">
                 <a:latin typeface="Adobe Fan Heiti Std B" panose="020B0700000000000000" pitchFamily="34" charset="-128"/>
                 <a:ea typeface="Adobe Fan Heiti Std B" panose="020B0700000000000000" pitchFamily="34" charset="-128"/>
               </a:rPr>
@@ -7496,23 +7174,12 @@
               <a:buChar char="•"/>
             </a:pPr>
             <a:r>
-              <a:rPr lang="en-US" dirty="0" smtClean="0">
+              <a:rPr lang="en-US" dirty="0">
                 <a:latin typeface="Adobe Fan Heiti Std B" panose="020B0700000000000000" pitchFamily="34" charset="-128"/>
                 <a:ea typeface="Adobe Fan Heiti Std B" panose="020B0700000000000000" pitchFamily="34" charset="-128"/>
               </a:rPr>
-              <a:t>Wants to </a:t>
-            </a:r>
-            <a:r>
-              <a:rPr lang="en-US" dirty="0" smtClean="0">
-                <a:latin typeface="Adobe Fan Heiti Std B" panose="020B0700000000000000" pitchFamily="34" charset="-128"/>
-                <a:ea typeface="Adobe Fan Heiti Std B" panose="020B0700000000000000" pitchFamily="34" charset="-128"/>
-              </a:rPr>
-              <a:t>make his school more appealing to prospective parents looking to enroll their child in private school</a:t>
-            </a:r>
-            <a:endParaRPr lang="en-US" dirty="0" smtClean="0">
-              <a:latin typeface="Adobe Fan Heiti Std B" panose="020B0700000000000000" pitchFamily="34" charset="-128"/>
-              <a:ea typeface="Adobe Fan Heiti Std B" panose="020B0700000000000000" pitchFamily="34" charset="-128"/>
-            </a:endParaRPr>
+              <a:t>Wants to make his school more appealing to prospective parents looking to enroll their child in private school</a:t>
+            </a:r>
           </a:p>
           <a:p>
             <a:pPr marL="285750" indent="-285750">
@@ -7520,7 +7187,7 @@
               <a:buChar char="•"/>
             </a:pPr>
             <a:r>
-              <a:rPr lang="en-US" dirty="0" smtClean="0">
+              <a:rPr lang="en-US" dirty="0">
                 <a:latin typeface="Adobe Fan Heiti Std B" panose="020B0700000000000000" pitchFamily="34" charset="-128"/>
                 <a:ea typeface="Adobe Fan Heiti Std B" panose="020B0700000000000000" pitchFamily="34" charset="-128"/>
               </a:rPr>
@@ -7578,7 +7245,7 @@
           <a:lstStyle/>
           <a:p>
             <a:r>
-              <a:rPr lang="en-US" sz="1200" b="1" i="1" dirty="0" smtClean="0">
+              <a:rPr lang="en-US" sz="1200" b="1" i="1" dirty="0">
                 <a:latin typeface="Arial" pitchFamily="34" charset="0"/>
                 <a:cs typeface="Arial" pitchFamily="34" charset="0"/>
               </a:rPr>
@@ -7587,7 +7254,7 @@
           </a:p>
           <a:p>
             <a:r>
-              <a:rPr lang="en-US" sz="1200" i="1" dirty="0" smtClean="0">
+              <a:rPr lang="en-US" sz="1200" i="1" dirty="0">
                 <a:latin typeface="Arial" pitchFamily="34" charset="0"/>
                 <a:cs typeface="Arial" pitchFamily="34" charset="0"/>
               </a:rPr>
@@ -7596,7 +7263,7 @@
           </a:p>
           <a:p>
             <a:r>
-              <a:rPr lang="en-US" sz="1200" i="1" dirty="0" smtClean="0">
+              <a:rPr lang="en-US" sz="1200" i="1" dirty="0">
                 <a:latin typeface="Arial" pitchFamily="34" charset="0"/>
                 <a:cs typeface="Arial" pitchFamily="34" charset="0"/>
               </a:rPr>
@@ -7651,17 +7318,10 @@
       </p:transition>
     </mc:Fallback>
   </mc:AlternateContent>
-  <p:timing>
-    <p:tnLst>
-      <p:par>
-        <p:cTn id="1" dur="indefinite" restart="never" nodeType="tmRoot"/>
-      </p:par>
-    </p:tnLst>
-  </p:timing>
 </p:sld>
 </file>
 
-<file path=ppt/slides/slide7.xml><?xml version="1.0" encoding="utf-8"?>
+<file path=ppt/slides/slide6.xml><?xml version="1.0" encoding="utf-8"?>
 <p:sld xmlns:a="http://schemas.openxmlformats.org/drawingml/2006/main" xmlns:r="http://schemas.openxmlformats.org/officeDocument/2006/relationships" xmlns:p="http://schemas.openxmlformats.org/presentationml/2006/main">
   <p:cSld>
     <p:spTree>
@@ -7694,235 +7354,139 @@
           <a:lstStyle/>
           <a:p>
             <a:r>
-              <a:rPr lang="en-US" b="1" dirty="0" smtClean="0">
+              <a:rPr lang="en-US" dirty="0">
                 <a:latin typeface="Adobe Fan Heiti Std B" panose="020B0700000000000000" pitchFamily="34" charset="-128"/>
                 <a:ea typeface="Adobe Fan Heiti Std B" panose="020B0700000000000000" pitchFamily="34" charset="-128"/>
               </a:rPr>
-              <a:t>What we have completed so far</a:t>
-            </a:r>
-            <a:endParaRPr lang="en-US" b="1" dirty="0">
-              <a:latin typeface="Adobe Fan Heiti Std B" panose="020B0700000000000000" pitchFamily="34" charset="-128"/>
-              <a:ea typeface="Adobe Fan Heiti Std B" panose="020B0700000000000000" pitchFamily="34" charset="-128"/>
-            </a:endParaRPr>
-          </a:p>
-        </p:txBody>
-      </p:sp>
-      <p:sp>
-        <p:nvSpPr>
-          <p:cNvPr id="3" name="Content Placeholder 2"/>
-          <p:cNvSpPr>
-            <a:spLocks noGrp="1"/>
-          </p:cNvSpPr>
-          <p:nvPr>
-            <p:ph idx="1"/>
-          </p:nvPr>
+              <a:t>Why Kiddo?</a:t>
+            </a:r>
+          </a:p>
+        </p:txBody>
+      </p:sp>
+      <p:sp>
+        <p:nvSpPr>
+          <p:cNvPr id="4" name="TextBox 3"/>
+          <p:cNvSpPr txBox="1"/>
+          <p:nvPr/>
         </p:nvSpPr>
         <p:spPr>
           <a:xfrm>
-            <a:off x="1559496" y="1628800"/>
-            <a:ext cx="9108504" cy="4176464"/>
+            <a:off x="1378968" y="1628800"/>
+            <a:ext cx="9289032" cy="3776931"/>
           </a:xfrm>
+          <a:prstGeom prst="rect">
+            <a:avLst/>
+          </a:prstGeom>
+          <a:noFill/>
         </p:spPr>
         <p:txBody>
-          <a:bodyPr>
-            <a:normAutofit/>
+          <a:bodyPr wrap="square" rtlCol="0">
+            <a:spAutoFit/>
           </a:bodyPr>
           <a:lstStyle/>
           <a:p>
-            <a:r>
-              <a:rPr lang="en-US" sz="2400" dirty="0" smtClean="0">
+            <a:pPr marL="228600" indent="-228600">
+              <a:lnSpc>
+                <a:spcPct val="90000"/>
+              </a:lnSpc>
+              <a:spcBef>
+                <a:spcPts val="1800"/>
+              </a:spcBef>
+              <a:buFont typeface="Arial" panose="020B0604020202020204" pitchFamily="34" charset="0"/>
+              <a:buChar char="•"/>
+            </a:pPr>
+            <a:r>
+              <a:rPr lang="en-CA" sz="2000" dirty="0">
                 <a:latin typeface="Adobe Fan Heiti Std B" panose="020B0700000000000000" pitchFamily="34" charset="-128"/>
                 <a:ea typeface="Adobe Fan Heiti Std B" panose="020B0700000000000000" pitchFamily="34" charset="-128"/>
               </a:rPr>
-              <a:t>Most of the front-end for the 3 user types</a:t>
-            </a:r>
-            <a:endParaRPr lang="en-US" sz="2400" dirty="0">
-              <a:latin typeface="Adobe Fan Heiti Std B" panose="020B0700000000000000" pitchFamily="34" charset="-128"/>
-              <a:ea typeface="Adobe Fan Heiti Std B" panose="020B0700000000000000" pitchFamily="34" charset="-128"/>
-            </a:endParaRPr>
-          </a:p>
-          <a:p>
-            <a:r>
-              <a:rPr lang="en-US" sz="2400" dirty="0" smtClean="0">
+              <a:t>P</a:t>
+            </a:r>
+            <a:r>
+              <a:rPr lang="en-US" sz="2400" dirty="0" err="1">
                 <a:latin typeface="Adobe Fan Heiti Std B" panose="020B0700000000000000" pitchFamily="34" charset="-128"/>
                 <a:ea typeface="Adobe Fan Heiti Std B" panose="020B0700000000000000" pitchFamily="34" charset="-128"/>
               </a:rPr>
-              <a:t>Linked database to the app</a:t>
-            </a:r>
-            <a:endParaRPr lang="en-US" sz="2400" dirty="0">
-              <a:latin typeface="Adobe Fan Heiti Std B" panose="020B0700000000000000" pitchFamily="34" charset="-128"/>
-              <a:ea typeface="Adobe Fan Heiti Std B" panose="020B0700000000000000" pitchFamily="34" charset="-128"/>
-            </a:endParaRPr>
-          </a:p>
-          <a:p>
-            <a:r>
-              <a:rPr lang="en-US" sz="2400" dirty="0" smtClean="0">
+              <a:t>rovides</a:t>
+            </a:r>
+            <a:r>
+              <a:rPr lang="en-US" sz="2400" dirty="0">
                 <a:latin typeface="Adobe Fan Heiti Std B" panose="020B0700000000000000" pitchFamily="34" charset="-128"/>
                 <a:ea typeface="Adobe Fan Heiti Std B" panose="020B0700000000000000" pitchFamily="34" charset="-128"/>
               </a:rPr>
-              <a:t>Started writing the required java classes to manipulate the database  </a:t>
-            </a:r>
-            <a:endParaRPr lang="en-US" sz="2400" dirty="0">
-              <a:latin typeface="Adobe Fan Heiti Std B" panose="020B0700000000000000" pitchFamily="34" charset="-128"/>
-              <a:ea typeface="Adobe Fan Heiti Std B" panose="020B0700000000000000" pitchFamily="34" charset="-128"/>
-            </a:endParaRPr>
-          </a:p>
-          <a:p>
-            <a:r>
-              <a:rPr lang="en-US" sz="2400" dirty="0" smtClean="0">
+              <a:t> a centralized platform for school updates and notifications</a:t>
+            </a:r>
+            <a:r>
+              <a:rPr lang="en-CA" sz="2400" dirty="0">
                 <a:latin typeface="Adobe Fan Heiti Std B" panose="020B0700000000000000" pitchFamily="34" charset="-128"/>
                 <a:ea typeface="Adobe Fan Heiti Std B" panose="020B0700000000000000" pitchFamily="34" charset="-128"/>
               </a:rPr>
-              <a:t>Started building a web interface for the administrator because the administrator role may require lots of data entry will be difficult on a mobile device.</a:t>
-            </a:r>
-          </a:p>
-          <a:p>
-            <a:pPr marL="0" indent="0">
-              <a:buNone/>
+              <a:t> </a:t>
+            </a:r>
+          </a:p>
+          <a:p>
+            <a:pPr marL="228600" indent="-228600">
+              <a:lnSpc>
+                <a:spcPct val="90000"/>
+              </a:lnSpc>
+              <a:spcBef>
+                <a:spcPts val="1800"/>
+              </a:spcBef>
+              <a:buFont typeface="Arial" panose="020B0604020202020204" pitchFamily="34" charset="0"/>
+              <a:buChar char="•"/>
             </a:pPr>
-            <a:endParaRPr lang="en-US" dirty="0"/>
+            <a:r>
+              <a:rPr lang="en-CA" sz="2400" dirty="0">
+                <a:latin typeface="Adobe Fan Heiti Std B" panose="020B0700000000000000" pitchFamily="34" charset="-128"/>
+                <a:ea typeface="Adobe Fan Heiti Std B" panose="020B0700000000000000" pitchFamily="34" charset="-128"/>
+              </a:rPr>
+              <a:t>Makes it easier for parents to view updates about their children and stay informed about what is happening at school</a:t>
+            </a:r>
+          </a:p>
+          <a:p>
+            <a:pPr marL="228600" indent="-228600">
+              <a:lnSpc>
+                <a:spcPct val="90000"/>
+              </a:lnSpc>
+              <a:spcBef>
+                <a:spcPts val="1800"/>
+              </a:spcBef>
+              <a:buFont typeface="Arial" panose="020B0604020202020204" pitchFamily="34" charset="0"/>
+              <a:buChar char="•"/>
+            </a:pPr>
+            <a:r>
+              <a:rPr lang="en-CA" sz="2400" dirty="0">
+                <a:latin typeface="Adobe Fan Heiti Std B" panose="020B0700000000000000" pitchFamily="34" charset="-128"/>
+                <a:ea typeface="Adobe Fan Heiti Std B" panose="020B0700000000000000" pitchFamily="34" charset="-128"/>
+              </a:rPr>
+              <a:t>Makes it easier for teachers to share class updates, particularly photos and videos</a:t>
+            </a:r>
+          </a:p>
+          <a:p>
+            <a:pPr marL="228600" indent="-228600">
+              <a:lnSpc>
+                <a:spcPct val="90000"/>
+              </a:lnSpc>
+              <a:spcBef>
+                <a:spcPts val="1800"/>
+              </a:spcBef>
+              <a:buFont typeface="Arial" panose="020B0604020202020204" pitchFamily="34" charset="0"/>
+              <a:buChar char="•"/>
+            </a:pPr>
+            <a:r>
+              <a:rPr lang="en-CA" sz="2400" dirty="0">
+                <a:latin typeface="Adobe Fan Heiti Std B" panose="020B0700000000000000" pitchFamily="34" charset="-128"/>
+                <a:ea typeface="Adobe Fan Heiti Std B" panose="020B0700000000000000" pitchFamily="34" charset="-128"/>
+              </a:rPr>
+              <a:t>It is secure since teachers must approve parents and the administrator controls the creation of teacher accounts and their classes</a:t>
+            </a:r>
           </a:p>
         </p:txBody>
       </p:sp>
     </p:spTree>
     <p:extLst>
       <p:ext uri="{BB962C8B-B14F-4D97-AF65-F5344CB8AC3E}">
-        <p14:creationId xmlns:p14="http://schemas.microsoft.com/office/powerpoint/2010/main" val="3485485506"/>
-      </p:ext>
-    </p:extLst>
-  </p:cSld>
-  <p:clrMapOvr>
-    <a:masterClrMapping/>
-  </p:clrMapOvr>
-  <mc:AlternateContent xmlns:mc="http://schemas.openxmlformats.org/markup-compatibility/2006" xmlns:p14="http://schemas.microsoft.com/office/powerpoint/2010/main">
-    <mc:Choice Requires="p14">
-      <p:transition spd="med" p14:dur="700">
-        <p:fade/>
-      </p:transition>
-    </mc:Choice>
-    <mc:Fallback xmlns="">
-      <p:transition spd="med">
-        <p:fade/>
-      </p:transition>
-    </mc:Fallback>
-  </mc:AlternateContent>
-</p:sld>
-</file>
-
-<file path=ppt/slides/slide8.xml><?xml version="1.0" encoding="utf-8"?>
-<p:sld xmlns:a="http://schemas.openxmlformats.org/drawingml/2006/main" xmlns:r="http://schemas.openxmlformats.org/officeDocument/2006/relationships" xmlns:p="http://schemas.openxmlformats.org/presentationml/2006/main">
-  <p:cSld>
-    <p:spTree>
-      <p:nvGrpSpPr>
-        <p:cNvPr id="1" name=""/>
-        <p:cNvGrpSpPr/>
-        <p:nvPr/>
-      </p:nvGrpSpPr>
-      <p:grpSpPr>
-        <a:xfrm>
-          <a:off x="0" y="0"/>
-          <a:ext cx="0" cy="0"/>
-          <a:chOff x="0" y="0"/>
-          <a:chExt cx="0" cy="0"/>
-        </a:xfrm>
-      </p:grpSpPr>
-      <p:sp>
-        <p:nvSpPr>
-          <p:cNvPr id="2" name="Title 1"/>
-          <p:cNvSpPr>
-            <a:spLocks noGrp="1"/>
-          </p:cNvSpPr>
-          <p:nvPr>
-            <p:ph type="title"/>
-          </p:nvPr>
-        </p:nvSpPr>
-        <p:spPr/>
-        <p:txBody>
-          <a:bodyPr/>
-          <a:lstStyle/>
-          <a:p>
-            <a:r>
-              <a:rPr lang="en-US" b="1" dirty="0" smtClean="0">
-                <a:latin typeface="Adobe Fan Heiti Std B" panose="020B0700000000000000" pitchFamily="34" charset="-128"/>
-                <a:ea typeface="Adobe Fan Heiti Std B" panose="020B0700000000000000" pitchFamily="34" charset="-128"/>
-              </a:rPr>
-              <a:t>What we plan to do next</a:t>
-            </a:r>
-            <a:endParaRPr lang="en-US" b="1" dirty="0">
-              <a:latin typeface="Adobe Fan Heiti Std B" panose="020B0700000000000000" pitchFamily="34" charset="-128"/>
-              <a:ea typeface="Adobe Fan Heiti Std B" panose="020B0700000000000000" pitchFamily="34" charset="-128"/>
-            </a:endParaRPr>
-          </a:p>
-        </p:txBody>
-      </p:sp>
-      <p:sp>
-        <p:nvSpPr>
-          <p:cNvPr id="3" name="Content Placeholder 2"/>
-          <p:cNvSpPr>
-            <a:spLocks noGrp="1"/>
-          </p:cNvSpPr>
-          <p:nvPr>
-            <p:ph idx="1"/>
-          </p:nvPr>
-        </p:nvSpPr>
-        <p:spPr>
-          <a:xfrm>
-            <a:off x="1559496" y="1628800"/>
-            <a:ext cx="9108504" cy="4176464"/>
-          </a:xfrm>
-        </p:spPr>
-        <p:txBody>
-          <a:bodyPr>
-            <a:normAutofit/>
-          </a:bodyPr>
-          <a:lstStyle/>
-          <a:p>
-            <a:r>
-              <a:rPr lang="en-US" sz="2400" dirty="0" smtClean="0">
-                <a:latin typeface="Adobe Fan Heiti Std B" panose="020B0700000000000000" pitchFamily="34" charset="-128"/>
-                <a:ea typeface="Adobe Fan Heiti Std B" panose="020B0700000000000000" pitchFamily="34" charset="-128"/>
-              </a:rPr>
-              <a:t>Finish writing the required java classes to manipulate the database</a:t>
-            </a:r>
-          </a:p>
-          <a:p>
-            <a:r>
-              <a:rPr lang="en-US" sz="2400" dirty="0" smtClean="0">
-                <a:latin typeface="Adobe Fan Heiti Std B" panose="020B0700000000000000" pitchFamily="34" charset="-128"/>
-                <a:ea typeface="Adobe Fan Heiti Std B" panose="020B0700000000000000" pitchFamily="34" charset="-128"/>
-              </a:rPr>
-              <a:t>Finish front-end for the 3 user types</a:t>
-            </a:r>
-            <a:endParaRPr lang="en-US" sz="2400" dirty="0">
-              <a:latin typeface="Adobe Fan Heiti Std B" panose="020B0700000000000000" pitchFamily="34" charset="-128"/>
-              <a:ea typeface="Adobe Fan Heiti Std B" panose="020B0700000000000000" pitchFamily="34" charset="-128"/>
-            </a:endParaRPr>
-          </a:p>
-          <a:p>
-            <a:r>
-              <a:rPr lang="en-US" sz="2400" dirty="0" smtClean="0">
-                <a:latin typeface="Adobe Fan Heiti Std B" panose="020B0700000000000000" pitchFamily="34" charset="-128"/>
-                <a:ea typeface="Adobe Fan Heiti Std B" panose="020B0700000000000000" pitchFamily="34" charset="-128"/>
-              </a:rPr>
-              <a:t>Finish the web interface for the administrator</a:t>
-            </a:r>
-            <a:endParaRPr lang="en-US" sz="2400" dirty="0">
-              <a:latin typeface="Adobe Fan Heiti Std B" panose="020B0700000000000000" pitchFamily="34" charset="-128"/>
-              <a:ea typeface="Adobe Fan Heiti Std B" panose="020B0700000000000000" pitchFamily="34" charset="-128"/>
-            </a:endParaRPr>
-          </a:p>
-          <a:p>
-            <a:pPr marL="0" indent="0">
-              <a:buNone/>
-            </a:pPr>
-            <a:endParaRPr lang="en-US" dirty="0"/>
-          </a:p>
-        </p:txBody>
-      </p:sp>
-    </p:spTree>
-    <p:extLst>
-      <p:ext uri="{BB962C8B-B14F-4D97-AF65-F5344CB8AC3E}">
-        <p14:creationId xmlns:p14="http://schemas.microsoft.com/office/powerpoint/2010/main" val="4121004042"/>
+        <p14:creationId xmlns:p14="http://schemas.microsoft.com/office/powerpoint/2010/main" val="3093572411"/>
       </p:ext>
     </p:extLst>
   </p:cSld>

</xml_diff>

<commit_message>
added update info activity for admin
</commit_message>
<xml_diff>
--- a/Kiddo.pptx
+++ b/Kiddo.pptx
@@ -6409,18 +6409,25 @@
         <p:spPr/>
         <p:txBody>
           <a:bodyPr>
-            <a:normAutofit fontScale="92500"/>
+            <a:normAutofit fontScale="70000" lnSpcReduction="20000"/>
           </a:bodyPr>
           <a:lstStyle/>
           <a:p>
-            <a:r>
-              <a:rPr lang="en-US" dirty="0">
-                <a:latin typeface="Comic Sans MS" panose="030F0702030302020204" pitchFamily="66" charset="0"/>
+            <a:pPr>
+              <a:lnSpc>
+                <a:spcPct val="110000"/>
+              </a:lnSpc>
+            </a:pPr>
+            <a:r>
+              <a:rPr lang="en-US" sz="3000" b="1" dirty="0">
+                <a:latin typeface="Adobe Fan Heiti Std B" panose="020B0700000000000000" pitchFamily="34" charset="-128"/>
+                <a:ea typeface="Adobe Fan Heiti Std B" panose="020B0700000000000000" pitchFamily="34" charset="-128"/>
               </a:rPr>
               <a:t>A communication platform for parents and teachers of students in daycare and private school.</a:t>
             </a:r>
-            <a:endParaRPr lang="en-CA" dirty="0">
-              <a:latin typeface="Comic Sans MS" panose="030F0702030302020204" pitchFamily="66" charset="0"/>
+            <a:endParaRPr lang="en-CA" sz="3000" b="1" dirty="0">
+              <a:latin typeface="Adobe Fan Heiti Std B" panose="020B0700000000000000" pitchFamily="34" charset="-128"/>
+              <a:ea typeface="Adobe Fan Heiti Std B" panose="020B0700000000000000" pitchFamily="34" charset="-128"/>
             </a:endParaRPr>
           </a:p>
           <a:p>
@@ -6456,6 +6463,11 @@
 <file path=ppt/slides/slide2.xml><?xml version="1.0" encoding="utf-8"?>
 <p:sld xmlns:a="http://schemas.openxmlformats.org/drawingml/2006/main" xmlns:r="http://schemas.openxmlformats.org/officeDocument/2006/relationships" xmlns:p="http://schemas.openxmlformats.org/presentationml/2006/main">
   <p:cSld>
+    <p:bg>
+      <p:bgRef idx="1001">
+        <a:schemeClr val="bg1"/>
+      </p:bgRef>
+    </p:bg>
     <p:spTree>
       <p:nvGrpSpPr>
         <p:cNvPr id="1" name=""/>
@@ -6577,7 +6589,7 @@
     </p:extLst>
   </p:cSld>
   <p:clrMapOvr>
-    <a:masterClrMapping/>
+    <a:overrideClrMapping bg1="lt1" tx1="dk1" bg2="lt2" tx2="dk2" accent1="accent1" accent2="accent2" accent3="accent3" accent4="accent4" accent5="accent5" accent6="accent6" hlink="hlink" folHlink="folHlink"/>
   </p:clrMapOvr>
   <mc:AlternateContent xmlns:mc="http://schemas.openxmlformats.org/markup-compatibility/2006" xmlns:p14="http://schemas.microsoft.com/office/powerpoint/2010/main">
     <mc:Choice Requires="p14">
@@ -6940,7 +6952,7 @@
                 <a:latin typeface="Adobe Fan Heiti Std B" panose="020B0700000000000000" pitchFamily="34" charset="-128"/>
                 <a:ea typeface="Adobe Fan Heiti Std B" panose="020B0700000000000000" pitchFamily="34" charset="-128"/>
               </a:rPr>
-              <a:t>Wants to share class updates securely and easily</a:t>
+              <a:t>Needs to share class updates as a part of his job</a:t>
             </a:r>
           </a:p>
           <a:p>
@@ -8291,6 +8303,49 @@
 </a:theme>
 </file>
 
+<file path=ppt/theme/themeOverride1.xml><?xml version="1.0" encoding="utf-8"?>
+<a:themeOverride xmlns:a="http://schemas.openxmlformats.org/drawingml/2006/main">
+  <a:clrScheme name="ChildrenFriends">
+    <a:dk1>
+      <a:srgbClr val="404040"/>
+    </a:dk1>
+    <a:lt1>
+      <a:sysClr val="window" lastClr="FFFFFF"/>
+    </a:lt1>
+    <a:dk2>
+      <a:srgbClr val="000000"/>
+    </a:dk2>
+    <a:lt2>
+      <a:srgbClr val="EAEAEA"/>
+    </a:lt2>
+    <a:accent1>
+      <a:srgbClr val="A63121"/>
+    </a:accent1>
+    <a:accent2>
+      <a:srgbClr val="318DCB"/>
+    </a:accent2>
+    <a:accent3>
+      <a:srgbClr val="F28330"/>
+    </a:accent3>
+    <a:accent4>
+      <a:srgbClr val="50B852"/>
+    </a:accent4>
+    <a:accent5>
+      <a:srgbClr val="EEAD1D"/>
+    </a:accent5>
+    <a:accent6>
+      <a:srgbClr val="A68555"/>
+    </a:accent6>
+    <a:hlink>
+      <a:srgbClr val="F28330"/>
+    </a:hlink>
+    <a:folHlink>
+      <a:srgbClr val="969696"/>
+    </a:folHlink>
+  </a:clrScheme>
+</a:themeOverride>
+</file>
+
 <file path=customXml/item1.xml><?xml version="1.0" encoding="utf-8"?>
 <?mso-contentType ?>
 <FormTemplates xmlns="http://schemas.microsoft.com/sharepoint/v3/contenttype/forms">

</xml_diff>